<commit_message>
update ppt with figures
</commit_message>
<xml_diff>
--- a/Text/Figures/Figures.pptx
+++ b/Text/Figures/Figures.pptx
@@ -5,18 +5,21 @@
     <p:sldMasterId id="2147483648" r:id="rId1"/>
   </p:sldMasterIdLst>
   <p:notesMasterIdLst>
-    <p:notesMasterId r:id="rId6"/>
+    <p:notesMasterId r:id="rId9"/>
   </p:notesMasterIdLst>
   <p:sldIdLst>
     <p:sldId id="256" r:id="rId2"/>
-    <p:sldId id="257" r:id="rId3"/>
-    <p:sldId id="258" r:id="rId4"/>
-    <p:sldId id="259" r:id="rId5"/>
+    <p:sldId id="260" r:id="rId3"/>
+    <p:sldId id="261" r:id="rId4"/>
+    <p:sldId id="257" r:id="rId5"/>
+    <p:sldId id="258" r:id="rId6"/>
+    <p:sldId id="259" r:id="rId7"/>
+    <p:sldId id="262" r:id="rId8"/>
   </p:sldIdLst>
   <p:sldSz cx="9144000" cy="6858000" type="screen4x3"/>
   <p:notesSz cx="6858000" cy="9144000"/>
   <p:custDataLst>
-    <p:tags r:id="rId7"/>
+    <p:tags r:id="rId10"/>
   </p:custDataLst>
   <p:defaultTextStyle>
     <a:defPPr>
@@ -539,7 +542,7 @@
           <a:p>
             <a:fld id="{86E490DF-36C7-444F-A331-0DC848EB08EA}" type="slidenum">
               <a:rPr lang="en-US" smtClean="0"/>
-              <a:t>2</a:t>
+              <a:t>4</a:t>
             </a:fld>
             <a:endParaRPr lang="en-US"/>
           </a:p>
@@ -3628,6 +3631,1031 @@
             <p:ph type="title"/>
           </p:nvPr>
         </p:nvSpPr>
+        <p:spPr/>
+        <p:txBody>
+          <a:bodyPr/>
+          <a:lstStyle/>
+          <a:p>
+            <a:r>
+              <a:rPr lang="en-US" dirty="0" smtClean="0"/>
+              <a:t>Figure 1</a:t>
+            </a:r>
+            <a:endParaRPr lang="en-US" dirty="0"/>
+          </a:p>
+        </p:txBody>
+      </p:sp>
+      <p:sp>
+        <p:nvSpPr>
+          <p:cNvPr id="3" name="Content Placeholder 2"/>
+          <p:cNvSpPr>
+            <a:spLocks noGrp="1"/>
+          </p:cNvSpPr>
+          <p:nvPr>
+            <p:ph idx="1"/>
+          </p:nvPr>
+        </p:nvSpPr>
+        <p:spPr/>
+        <p:txBody>
+          <a:bodyPr>
+            <a:normAutofit/>
+          </a:bodyPr>
+          <a:lstStyle/>
+          <a:p>
+            <a:r>
+              <a:rPr lang="en-US" sz="2400" dirty="0" smtClean="0"/>
+              <a:t>Contact angle does not depend on substrate curvature. Benchmark</a:t>
+            </a:r>
+          </a:p>
+          <a:p>
+            <a:r>
+              <a:rPr lang="en-US" sz="2400" dirty="0" smtClean="0"/>
+              <a:t>Literature – from experiments we don’t expect it</a:t>
+            </a:r>
+          </a:p>
+          <a:p>
+            <a:r>
+              <a:rPr lang="en-US" sz="2400" dirty="0" smtClean="0"/>
+              <a:t>Literature - Simulation results are consistent with previous simulations</a:t>
+            </a:r>
+            <a:endParaRPr lang="en-US" sz="2400" dirty="0"/>
+          </a:p>
+        </p:txBody>
+      </p:sp>
+      <p:sp>
+        <p:nvSpPr>
+          <p:cNvPr id="4" name="Oval 3"/>
+          <p:cNvSpPr/>
+          <p:nvPr/>
+        </p:nvSpPr>
+        <p:spPr>
+          <a:xfrm>
+            <a:off x="914400" y="4038600"/>
+            <a:ext cx="914400" cy="914400"/>
+          </a:xfrm>
+          <a:prstGeom prst="ellipse">
+            <a:avLst/>
+          </a:prstGeom>
+        </p:spPr>
+        <p:style>
+          <a:lnRef idx="2">
+            <a:schemeClr val="accent1">
+              <a:shade val="50000"/>
+            </a:schemeClr>
+          </a:lnRef>
+          <a:fillRef idx="1">
+            <a:schemeClr val="accent1"/>
+          </a:fillRef>
+          <a:effectRef idx="0">
+            <a:schemeClr val="accent1"/>
+          </a:effectRef>
+          <a:fontRef idx="minor">
+            <a:schemeClr val="lt1"/>
+          </a:fontRef>
+        </p:style>
+        <p:txBody>
+          <a:bodyPr rtlCol="0" anchor="ctr"/>
+          <a:lstStyle/>
+          <a:p>
+            <a:pPr algn="ctr"/>
+            <a:endParaRPr lang="en-US"/>
+          </a:p>
+        </p:txBody>
+      </p:sp>
+      <p:sp>
+        <p:nvSpPr>
+          <p:cNvPr id="5" name="Oval 4"/>
+          <p:cNvSpPr/>
+          <p:nvPr/>
+        </p:nvSpPr>
+        <p:spPr>
+          <a:xfrm>
+            <a:off x="609600" y="3733800"/>
+            <a:ext cx="609600" cy="609600"/>
+          </a:xfrm>
+          <a:prstGeom prst="ellipse">
+            <a:avLst/>
+          </a:prstGeom>
+        </p:spPr>
+        <p:style>
+          <a:lnRef idx="2">
+            <a:schemeClr val="accent1">
+              <a:shade val="50000"/>
+            </a:schemeClr>
+          </a:lnRef>
+          <a:fillRef idx="1">
+            <a:schemeClr val="accent1"/>
+          </a:fillRef>
+          <a:effectRef idx="0">
+            <a:schemeClr val="accent1"/>
+          </a:effectRef>
+          <a:fontRef idx="minor">
+            <a:schemeClr val="lt1"/>
+          </a:fontRef>
+        </p:style>
+        <p:txBody>
+          <a:bodyPr rtlCol="0" anchor="ctr"/>
+          <a:lstStyle/>
+          <a:p>
+            <a:pPr algn="ctr"/>
+            <a:endParaRPr lang="en-US"/>
+          </a:p>
+        </p:txBody>
+      </p:sp>
+      <p:sp>
+        <p:nvSpPr>
+          <p:cNvPr id="6" name="Rectangle 5"/>
+          <p:cNvSpPr/>
+          <p:nvPr/>
+        </p:nvSpPr>
+        <p:spPr>
+          <a:xfrm>
+            <a:off x="914400" y="5623560"/>
+            <a:ext cx="914400" cy="914400"/>
+          </a:xfrm>
+          <a:prstGeom prst="rect">
+            <a:avLst/>
+          </a:prstGeom>
+        </p:spPr>
+        <p:style>
+          <a:lnRef idx="2">
+            <a:schemeClr val="accent1">
+              <a:shade val="50000"/>
+            </a:schemeClr>
+          </a:lnRef>
+          <a:fillRef idx="1">
+            <a:schemeClr val="accent1"/>
+          </a:fillRef>
+          <a:effectRef idx="0">
+            <a:schemeClr val="accent1"/>
+          </a:effectRef>
+          <a:fontRef idx="minor">
+            <a:schemeClr val="lt1"/>
+          </a:fontRef>
+        </p:style>
+        <p:txBody>
+          <a:bodyPr rtlCol="0" anchor="ctr"/>
+          <a:lstStyle/>
+          <a:p>
+            <a:pPr algn="ctr"/>
+            <a:endParaRPr lang="en-US"/>
+          </a:p>
+        </p:txBody>
+      </p:sp>
+      <p:sp>
+        <p:nvSpPr>
+          <p:cNvPr id="7" name="Oval 6"/>
+          <p:cNvSpPr/>
+          <p:nvPr/>
+        </p:nvSpPr>
+        <p:spPr>
+          <a:xfrm>
+            <a:off x="1066800" y="5242560"/>
+            <a:ext cx="533400" cy="533400"/>
+          </a:xfrm>
+          <a:prstGeom prst="ellipse">
+            <a:avLst/>
+          </a:prstGeom>
+        </p:spPr>
+        <p:style>
+          <a:lnRef idx="2">
+            <a:schemeClr val="accent1">
+              <a:shade val="50000"/>
+            </a:schemeClr>
+          </a:lnRef>
+          <a:fillRef idx="1">
+            <a:schemeClr val="accent1"/>
+          </a:fillRef>
+          <a:effectRef idx="0">
+            <a:schemeClr val="accent1"/>
+          </a:effectRef>
+          <a:fontRef idx="minor">
+            <a:schemeClr val="lt1"/>
+          </a:fontRef>
+        </p:style>
+        <p:txBody>
+          <a:bodyPr rtlCol="0" anchor="ctr"/>
+          <a:lstStyle/>
+          <a:p>
+            <a:pPr algn="ctr"/>
+            <a:endParaRPr lang="en-US"/>
+          </a:p>
+        </p:txBody>
+      </p:sp>
+      <p:cxnSp>
+        <p:nvCxnSpPr>
+          <p:cNvPr id="9" name="Straight Arrow Connector 8"/>
+          <p:cNvCxnSpPr/>
+          <p:nvPr/>
+        </p:nvCxnSpPr>
+        <p:spPr>
+          <a:xfrm flipV="1">
+            <a:off x="3048000" y="3886200"/>
+            <a:ext cx="0" cy="2438400"/>
+          </a:xfrm>
+          <a:prstGeom prst="straightConnector1">
+            <a:avLst/>
+          </a:prstGeom>
+          <a:ln>
+            <a:tailEnd type="arrow"/>
+          </a:ln>
+        </p:spPr>
+        <p:style>
+          <a:lnRef idx="1">
+            <a:schemeClr val="accent1"/>
+          </a:lnRef>
+          <a:fillRef idx="0">
+            <a:schemeClr val="accent1"/>
+          </a:fillRef>
+          <a:effectRef idx="0">
+            <a:schemeClr val="accent1"/>
+          </a:effectRef>
+          <a:fontRef idx="minor">
+            <a:schemeClr val="tx1"/>
+          </a:fontRef>
+        </p:style>
+      </p:cxnSp>
+      <p:cxnSp>
+        <p:nvCxnSpPr>
+          <p:cNvPr id="11" name="Straight Arrow Connector 10"/>
+          <p:cNvCxnSpPr/>
+          <p:nvPr/>
+        </p:nvCxnSpPr>
+        <p:spPr>
+          <a:xfrm>
+            <a:off x="3048000" y="6324600"/>
+            <a:ext cx="2667000" cy="0"/>
+          </a:xfrm>
+          <a:prstGeom prst="straightConnector1">
+            <a:avLst/>
+          </a:prstGeom>
+          <a:ln>
+            <a:tailEnd type="arrow"/>
+          </a:ln>
+        </p:spPr>
+        <p:style>
+          <a:lnRef idx="1">
+            <a:schemeClr val="accent1"/>
+          </a:lnRef>
+          <a:fillRef idx="0">
+            <a:schemeClr val="accent1"/>
+          </a:fillRef>
+          <a:effectRef idx="0">
+            <a:schemeClr val="accent1"/>
+          </a:effectRef>
+          <a:fontRef idx="minor">
+            <a:schemeClr val="tx1"/>
+          </a:fontRef>
+        </p:style>
+      </p:cxnSp>
+      <p:sp>
+        <p:nvSpPr>
+          <p:cNvPr id="12" name="TextBox 11"/>
+          <p:cNvSpPr txBox="1"/>
+          <p:nvPr/>
+        </p:nvSpPr>
+        <p:spPr>
+          <a:xfrm>
+            <a:off x="3593688" y="6372888"/>
+            <a:ext cx="1575624" cy="369332"/>
+          </a:xfrm>
+          <a:prstGeom prst="rect">
+            <a:avLst/>
+          </a:prstGeom>
+          <a:noFill/>
+        </p:spPr>
+        <p:txBody>
+          <a:bodyPr wrap="none" rtlCol="0">
+            <a:spAutoFit/>
+          </a:bodyPr>
+          <a:lstStyle/>
+          <a:p>
+            <a:r>
+              <a:rPr lang="en-US" dirty="0" smtClean="0"/>
+              <a:t>Phase gradient</a:t>
+            </a:r>
+            <a:endParaRPr lang="en-US" dirty="0"/>
+          </a:p>
+        </p:txBody>
+      </p:sp>
+      <p:sp>
+        <p:nvSpPr>
+          <p:cNvPr id="13" name="TextBox 12"/>
+          <p:cNvSpPr txBox="1"/>
+          <p:nvPr/>
+        </p:nvSpPr>
+        <p:spPr>
+          <a:xfrm rot="16200000">
+            <a:off x="1963393" y="5067307"/>
+            <a:ext cx="1471750" cy="369332"/>
+          </a:xfrm>
+          <a:prstGeom prst="rect">
+            <a:avLst/>
+          </a:prstGeom>
+          <a:noFill/>
+        </p:spPr>
+        <p:txBody>
+          <a:bodyPr wrap="none" rtlCol="0">
+            <a:spAutoFit/>
+          </a:bodyPr>
+          <a:lstStyle/>
+          <a:p>
+            <a:r>
+              <a:rPr lang="en-US" dirty="0" smtClean="0"/>
+              <a:t>Contact angle</a:t>
+            </a:r>
+            <a:endParaRPr lang="en-US" dirty="0"/>
+          </a:p>
+        </p:txBody>
+      </p:sp>
+      <p:cxnSp>
+        <p:nvCxnSpPr>
+          <p:cNvPr id="15" name="Straight Connector 14"/>
+          <p:cNvCxnSpPr/>
+          <p:nvPr/>
+        </p:nvCxnSpPr>
+        <p:spPr>
+          <a:xfrm flipV="1">
+            <a:off x="3352800" y="4038600"/>
+            <a:ext cx="1981200" cy="2042160"/>
+          </a:xfrm>
+          <a:prstGeom prst="line">
+            <a:avLst/>
+          </a:prstGeom>
+        </p:spPr>
+        <p:style>
+          <a:lnRef idx="1">
+            <a:schemeClr val="accent1"/>
+          </a:lnRef>
+          <a:fillRef idx="0">
+            <a:schemeClr val="accent1"/>
+          </a:fillRef>
+          <a:effectRef idx="0">
+            <a:schemeClr val="accent1"/>
+          </a:effectRef>
+          <a:fontRef idx="minor">
+            <a:schemeClr val="tx1"/>
+          </a:fontRef>
+        </p:style>
+      </p:cxnSp>
+      <p:sp>
+        <p:nvSpPr>
+          <p:cNvPr id="16" name="TextBox 15"/>
+          <p:cNvSpPr txBox="1"/>
+          <p:nvPr/>
+        </p:nvSpPr>
+        <p:spPr>
+          <a:xfrm>
+            <a:off x="6096000" y="4343400"/>
+            <a:ext cx="2021836" cy="923330"/>
+          </a:xfrm>
+          <a:prstGeom prst="rect">
+            <a:avLst/>
+          </a:prstGeom>
+          <a:noFill/>
+        </p:spPr>
+        <p:txBody>
+          <a:bodyPr wrap="none" rtlCol="0">
+            <a:spAutoFit/>
+          </a:bodyPr>
+          <a:lstStyle/>
+          <a:p>
+            <a:r>
+              <a:rPr lang="en-US" dirty="0" smtClean="0"/>
+              <a:t>Previous simulation</a:t>
+            </a:r>
+          </a:p>
+          <a:p>
+            <a:r>
+              <a:rPr lang="en-US" dirty="0" smtClean="0"/>
+              <a:t>Flat substrate</a:t>
+            </a:r>
+          </a:p>
+          <a:p>
+            <a:r>
+              <a:rPr lang="en-US" dirty="0" smtClean="0"/>
+              <a:t>Curved substrate</a:t>
+            </a:r>
+            <a:endParaRPr lang="en-US" dirty="0"/>
+          </a:p>
+        </p:txBody>
+      </p:sp>
+    </p:spTree>
+    <p:extLst>
+      <p:ext uri="{BB962C8B-B14F-4D97-AF65-F5344CB8AC3E}">
+        <p14:creationId xmlns:p14="http://schemas.microsoft.com/office/powerpoint/2010/main" val="1875533279"/>
+      </p:ext>
+    </p:extLst>
+  </p:cSld>
+  <p:clrMapOvr>
+    <a:masterClrMapping/>
+  </p:clrMapOvr>
+</p:sld>
+</file>
+
+<file path=ppt/slides/slide3.xml><?xml version="1.0" encoding="utf-8"?>
+<p:sld xmlns:a="http://schemas.openxmlformats.org/drawingml/2006/main" xmlns:r="http://schemas.openxmlformats.org/officeDocument/2006/relationships" xmlns:p="http://schemas.openxmlformats.org/presentationml/2006/main">
+  <p:cSld>
+    <p:spTree>
+      <p:nvGrpSpPr>
+        <p:cNvPr id="1" name=""/>
+        <p:cNvGrpSpPr/>
+        <p:nvPr/>
+      </p:nvGrpSpPr>
+      <p:grpSpPr>
+        <a:xfrm>
+          <a:off x="0" y="0"/>
+          <a:ext cx="0" cy="0"/>
+          <a:chOff x="0" y="0"/>
+          <a:chExt cx="0" cy="0"/>
+        </a:xfrm>
+      </p:grpSpPr>
+      <p:sp>
+        <p:nvSpPr>
+          <p:cNvPr id="2" name="Title 1"/>
+          <p:cNvSpPr>
+            <a:spLocks noGrp="1"/>
+          </p:cNvSpPr>
+          <p:nvPr>
+            <p:ph type="title"/>
+          </p:nvPr>
+        </p:nvSpPr>
+        <p:spPr/>
+        <p:txBody>
+          <a:bodyPr/>
+          <a:lstStyle/>
+          <a:p>
+            <a:r>
+              <a:rPr lang="en-US" dirty="0" smtClean="0"/>
+              <a:t>Figure 2</a:t>
+            </a:r>
+            <a:endParaRPr lang="en-US" dirty="0"/>
+          </a:p>
+        </p:txBody>
+      </p:sp>
+      <p:sp>
+        <p:nvSpPr>
+          <p:cNvPr id="3" name="Content Placeholder 2"/>
+          <p:cNvSpPr>
+            <a:spLocks noGrp="1"/>
+          </p:cNvSpPr>
+          <p:nvPr>
+            <p:ph idx="1"/>
+          </p:nvPr>
+        </p:nvSpPr>
+        <p:spPr>
+          <a:xfrm>
+            <a:off x="457200" y="1371600"/>
+            <a:ext cx="8229600" cy="4525963"/>
+          </a:xfrm>
+        </p:spPr>
+        <p:txBody>
+          <a:bodyPr/>
+          <a:lstStyle/>
+          <a:p>
+            <a:r>
+              <a:rPr lang="en-US" dirty="0" smtClean="0"/>
+              <a:t>Collision simulation</a:t>
+            </a:r>
+            <a:endParaRPr lang="en-US" dirty="0"/>
+          </a:p>
+        </p:txBody>
+      </p:sp>
+      <p:sp>
+        <p:nvSpPr>
+          <p:cNvPr id="4" name="Rectangle 3"/>
+          <p:cNvSpPr/>
+          <p:nvPr/>
+        </p:nvSpPr>
+        <p:spPr>
+          <a:xfrm>
+            <a:off x="533400" y="1981200"/>
+            <a:ext cx="7848600" cy="1066800"/>
+          </a:xfrm>
+          <a:prstGeom prst="rect">
+            <a:avLst/>
+          </a:prstGeom>
+        </p:spPr>
+        <p:style>
+          <a:lnRef idx="2">
+            <a:schemeClr val="accent1">
+              <a:shade val="50000"/>
+            </a:schemeClr>
+          </a:lnRef>
+          <a:fillRef idx="1">
+            <a:schemeClr val="accent1"/>
+          </a:fillRef>
+          <a:effectRef idx="0">
+            <a:schemeClr val="accent1"/>
+          </a:effectRef>
+          <a:fontRef idx="minor">
+            <a:schemeClr val="lt1"/>
+          </a:fontRef>
+        </p:style>
+        <p:txBody>
+          <a:bodyPr rtlCol="0" anchor="ctr"/>
+          <a:lstStyle/>
+          <a:p>
+            <a:pPr algn="ctr"/>
+            <a:r>
+              <a:rPr lang="en-US" dirty="0" smtClean="0"/>
+              <a:t>equilibration</a:t>
+            </a:r>
+            <a:endParaRPr lang="en-US" dirty="0"/>
+          </a:p>
+        </p:txBody>
+      </p:sp>
+      <p:sp>
+        <p:nvSpPr>
+          <p:cNvPr id="5" name="Oval 4"/>
+          <p:cNvSpPr/>
+          <p:nvPr/>
+        </p:nvSpPr>
+        <p:spPr>
+          <a:xfrm>
+            <a:off x="989511" y="2247900"/>
+            <a:ext cx="533400" cy="533400"/>
+          </a:xfrm>
+          <a:prstGeom prst="ellipse">
+            <a:avLst/>
+          </a:prstGeom>
+        </p:spPr>
+        <p:style>
+          <a:lnRef idx="2">
+            <a:schemeClr val="accent1">
+              <a:shade val="50000"/>
+            </a:schemeClr>
+          </a:lnRef>
+          <a:fillRef idx="1">
+            <a:schemeClr val="accent1"/>
+          </a:fillRef>
+          <a:effectRef idx="0">
+            <a:schemeClr val="accent1"/>
+          </a:effectRef>
+          <a:fontRef idx="minor">
+            <a:schemeClr val="lt1"/>
+          </a:fontRef>
+        </p:style>
+        <p:txBody>
+          <a:bodyPr rtlCol="0" anchor="ctr"/>
+          <a:lstStyle/>
+          <a:p>
+            <a:pPr algn="ctr"/>
+            <a:endParaRPr lang="en-US"/>
+          </a:p>
+        </p:txBody>
+      </p:sp>
+      <p:sp>
+        <p:nvSpPr>
+          <p:cNvPr id="6" name="Rectangle 5"/>
+          <p:cNvSpPr/>
+          <p:nvPr/>
+        </p:nvSpPr>
+        <p:spPr>
+          <a:xfrm>
+            <a:off x="533400" y="3200400"/>
+            <a:ext cx="7848600" cy="1066800"/>
+          </a:xfrm>
+          <a:prstGeom prst="rect">
+            <a:avLst/>
+          </a:prstGeom>
+        </p:spPr>
+        <p:style>
+          <a:lnRef idx="2">
+            <a:schemeClr val="accent1">
+              <a:shade val="50000"/>
+            </a:schemeClr>
+          </a:lnRef>
+          <a:fillRef idx="1">
+            <a:schemeClr val="accent1"/>
+          </a:fillRef>
+          <a:effectRef idx="0">
+            <a:schemeClr val="accent1"/>
+          </a:effectRef>
+          <a:fontRef idx="minor">
+            <a:schemeClr val="lt1"/>
+          </a:fontRef>
+        </p:style>
+        <p:txBody>
+          <a:bodyPr rtlCol="0" anchor="ctr"/>
+          <a:lstStyle/>
+          <a:p>
+            <a:pPr algn="ctr"/>
+            <a:r>
+              <a:rPr lang="en-US" dirty="0" smtClean="0"/>
+              <a:t>Acceleration</a:t>
+            </a:r>
+            <a:endParaRPr lang="en-US" dirty="0"/>
+          </a:p>
+        </p:txBody>
+      </p:sp>
+      <p:sp>
+        <p:nvSpPr>
+          <p:cNvPr id="7" name="Oval 6"/>
+          <p:cNvSpPr/>
+          <p:nvPr/>
+        </p:nvSpPr>
+        <p:spPr>
+          <a:xfrm>
+            <a:off x="2209800" y="3467100"/>
+            <a:ext cx="533400" cy="533400"/>
+          </a:xfrm>
+          <a:prstGeom prst="ellipse">
+            <a:avLst/>
+          </a:prstGeom>
+        </p:spPr>
+        <p:style>
+          <a:lnRef idx="2">
+            <a:schemeClr val="accent1">
+              <a:shade val="50000"/>
+            </a:schemeClr>
+          </a:lnRef>
+          <a:fillRef idx="1">
+            <a:schemeClr val="accent1"/>
+          </a:fillRef>
+          <a:effectRef idx="0">
+            <a:schemeClr val="accent1"/>
+          </a:effectRef>
+          <a:fontRef idx="minor">
+            <a:schemeClr val="lt1"/>
+          </a:fontRef>
+        </p:style>
+        <p:txBody>
+          <a:bodyPr rtlCol="0" anchor="ctr"/>
+          <a:lstStyle/>
+          <a:p>
+            <a:pPr algn="ctr"/>
+            <a:endParaRPr lang="en-US"/>
+          </a:p>
+        </p:txBody>
+      </p:sp>
+      <p:sp>
+        <p:nvSpPr>
+          <p:cNvPr id="8" name="Oval 7"/>
+          <p:cNvSpPr/>
+          <p:nvPr/>
+        </p:nvSpPr>
+        <p:spPr>
+          <a:xfrm>
+            <a:off x="6934200" y="2209800"/>
+            <a:ext cx="533400" cy="533400"/>
+          </a:xfrm>
+          <a:prstGeom prst="ellipse">
+            <a:avLst/>
+          </a:prstGeom>
+        </p:spPr>
+        <p:style>
+          <a:lnRef idx="2">
+            <a:schemeClr val="accent1">
+              <a:shade val="50000"/>
+            </a:schemeClr>
+          </a:lnRef>
+          <a:fillRef idx="1">
+            <a:schemeClr val="accent1"/>
+          </a:fillRef>
+          <a:effectRef idx="0">
+            <a:schemeClr val="accent1"/>
+          </a:effectRef>
+          <a:fontRef idx="minor">
+            <a:schemeClr val="lt1"/>
+          </a:fontRef>
+        </p:style>
+        <p:txBody>
+          <a:bodyPr rtlCol="0" anchor="ctr"/>
+          <a:lstStyle/>
+          <a:p>
+            <a:pPr algn="ctr"/>
+            <a:endParaRPr lang="en-US"/>
+          </a:p>
+        </p:txBody>
+      </p:sp>
+      <p:sp>
+        <p:nvSpPr>
+          <p:cNvPr id="9" name="Oval 8"/>
+          <p:cNvSpPr/>
+          <p:nvPr/>
+        </p:nvSpPr>
+        <p:spPr>
+          <a:xfrm>
+            <a:off x="6934200" y="3429000"/>
+            <a:ext cx="533400" cy="533400"/>
+          </a:xfrm>
+          <a:prstGeom prst="ellipse">
+            <a:avLst/>
+          </a:prstGeom>
+        </p:spPr>
+        <p:style>
+          <a:lnRef idx="2">
+            <a:schemeClr val="accent1">
+              <a:shade val="50000"/>
+            </a:schemeClr>
+          </a:lnRef>
+          <a:fillRef idx="1">
+            <a:schemeClr val="accent1"/>
+          </a:fillRef>
+          <a:effectRef idx="0">
+            <a:schemeClr val="accent1"/>
+          </a:effectRef>
+          <a:fontRef idx="minor">
+            <a:schemeClr val="lt1"/>
+          </a:fontRef>
+        </p:style>
+        <p:txBody>
+          <a:bodyPr rtlCol="0" anchor="ctr"/>
+          <a:lstStyle/>
+          <a:p>
+            <a:pPr algn="ctr"/>
+            <a:endParaRPr lang="en-US"/>
+          </a:p>
+        </p:txBody>
+      </p:sp>
+      <p:sp>
+        <p:nvSpPr>
+          <p:cNvPr id="10" name="Rectangle 9"/>
+          <p:cNvSpPr/>
+          <p:nvPr/>
+        </p:nvSpPr>
+        <p:spPr>
+          <a:xfrm>
+            <a:off x="533400" y="4419600"/>
+            <a:ext cx="7848600" cy="1066800"/>
+          </a:xfrm>
+          <a:prstGeom prst="rect">
+            <a:avLst/>
+          </a:prstGeom>
+        </p:spPr>
+        <p:style>
+          <a:lnRef idx="2">
+            <a:schemeClr val="accent1">
+              <a:shade val="50000"/>
+            </a:schemeClr>
+          </a:lnRef>
+          <a:fillRef idx="1">
+            <a:schemeClr val="accent1"/>
+          </a:fillRef>
+          <a:effectRef idx="0">
+            <a:schemeClr val="accent1"/>
+          </a:effectRef>
+          <a:fontRef idx="minor">
+            <a:schemeClr val="lt1"/>
+          </a:fontRef>
+        </p:style>
+        <p:txBody>
+          <a:bodyPr rtlCol="0" anchor="ctr"/>
+          <a:lstStyle/>
+          <a:p>
+            <a:pPr algn="ctr"/>
+            <a:r>
+              <a:rPr lang="en-US" dirty="0" smtClean="0"/>
+              <a:t>Collision pre wetting</a:t>
+            </a:r>
+            <a:endParaRPr lang="en-US" dirty="0"/>
+          </a:p>
+        </p:txBody>
+      </p:sp>
+      <p:sp>
+        <p:nvSpPr>
+          <p:cNvPr id="11" name="Oval 10"/>
+          <p:cNvSpPr/>
+          <p:nvPr/>
+        </p:nvSpPr>
+        <p:spPr>
+          <a:xfrm>
+            <a:off x="6400800" y="4666705"/>
+            <a:ext cx="533400" cy="533400"/>
+          </a:xfrm>
+          <a:prstGeom prst="ellipse">
+            <a:avLst/>
+          </a:prstGeom>
+        </p:spPr>
+        <p:style>
+          <a:lnRef idx="2">
+            <a:schemeClr val="accent1">
+              <a:shade val="50000"/>
+            </a:schemeClr>
+          </a:lnRef>
+          <a:fillRef idx="1">
+            <a:schemeClr val="accent1"/>
+          </a:fillRef>
+          <a:effectRef idx="0">
+            <a:schemeClr val="accent1"/>
+          </a:effectRef>
+          <a:fontRef idx="minor">
+            <a:schemeClr val="lt1"/>
+          </a:fontRef>
+        </p:style>
+        <p:txBody>
+          <a:bodyPr rtlCol="0" anchor="ctr"/>
+          <a:lstStyle/>
+          <a:p>
+            <a:pPr algn="ctr"/>
+            <a:endParaRPr lang="en-US"/>
+          </a:p>
+        </p:txBody>
+      </p:sp>
+      <p:sp>
+        <p:nvSpPr>
+          <p:cNvPr id="12" name="Oval 11"/>
+          <p:cNvSpPr/>
+          <p:nvPr/>
+        </p:nvSpPr>
+        <p:spPr>
+          <a:xfrm>
+            <a:off x="6934200" y="4648200"/>
+            <a:ext cx="533400" cy="533400"/>
+          </a:xfrm>
+          <a:prstGeom prst="ellipse">
+            <a:avLst/>
+          </a:prstGeom>
+        </p:spPr>
+        <p:style>
+          <a:lnRef idx="2">
+            <a:schemeClr val="accent1">
+              <a:shade val="50000"/>
+            </a:schemeClr>
+          </a:lnRef>
+          <a:fillRef idx="1">
+            <a:schemeClr val="accent1"/>
+          </a:fillRef>
+          <a:effectRef idx="0">
+            <a:schemeClr val="accent1"/>
+          </a:effectRef>
+          <a:fontRef idx="minor">
+            <a:schemeClr val="lt1"/>
+          </a:fontRef>
+        </p:style>
+        <p:txBody>
+          <a:bodyPr rtlCol="0" anchor="ctr"/>
+          <a:lstStyle/>
+          <a:p>
+            <a:pPr algn="ctr"/>
+            <a:endParaRPr lang="en-US"/>
+          </a:p>
+        </p:txBody>
+      </p:sp>
+      <p:sp>
+        <p:nvSpPr>
+          <p:cNvPr id="13" name="Rectangle 12"/>
+          <p:cNvSpPr/>
+          <p:nvPr/>
+        </p:nvSpPr>
+        <p:spPr>
+          <a:xfrm>
+            <a:off x="533400" y="5638800"/>
+            <a:ext cx="7848600" cy="1066800"/>
+          </a:xfrm>
+          <a:prstGeom prst="rect">
+            <a:avLst/>
+          </a:prstGeom>
+        </p:spPr>
+        <p:style>
+          <a:lnRef idx="2">
+            <a:schemeClr val="accent1">
+              <a:shade val="50000"/>
+            </a:schemeClr>
+          </a:lnRef>
+          <a:fillRef idx="1">
+            <a:schemeClr val="accent1"/>
+          </a:fillRef>
+          <a:effectRef idx="0">
+            <a:schemeClr val="accent1"/>
+          </a:effectRef>
+          <a:fontRef idx="minor">
+            <a:schemeClr val="lt1"/>
+          </a:fontRef>
+        </p:style>
+        <p:txBody>
+          <a:bodyPr rtlCol="0" anchor="ctr"/>
+          <a:lstStyle/>
+          <a:p>
+            <a:pPr algn="ctr"/>
+            <a:r>
+              <a:rPr lang="en-US" dirty="0" smtClean="0"/>
+              <a:t>Collision wetting</a:t>
+            </a:r>
+            <a:endParaRPr lang="en-US" dirty="0"/>
+          </a:p>
+        </p:txBody>
+      </p:sp>
+      <p:sp>
+        <p:nvSpPr>
+          <p:cNvPr id="14" name="Oval 13"/>
+          <p:cNvSpPr/>
+          <p:nvPr/>
+        </p:nvSpPr>
+        <p:spPr>
+          <a:xfrm>
+            <a:off x="6400800" y="5885905"/>
+            <a:ext cx="533400" cy="533400"/>
+          </a:xfrm>
+          <a:prstGeom prst="ellipse">
+            <a:avLst/>
+          </a:prstGeom>
+        </p:spPr>
+        <p:style>
+          <a:lnRef idx="2">
+            <a:schemeClr val="accent1">
+              <a:shade val="50000"/>
+            </a:schemeClr>
+          </a:lnRef>
+          <a:fillRef idx="1">
+            <a:schemeClr val="accent1"/>
+          </a:fillRef>
+          <a:effectRef idx="0">
+            <a:schemeClr val="accent1"/>
+          </a:effectRef>
+          <a:fontRef idx="minor">
+            <a:schemeClr val="lt1"/>
+          </a:fontRef>
+        </p:style>
+        <p:txBody>
+          <a:bodyPr rtlCol="0" anchor="ctr"/>
+          <a:lstStyle/>
+          <a:p>
+            <a:pPr algn="ctr"/>
+            <a:endParaRPr lang="en-US"/>
+          </a:p>
+        </p:txBody>
+      </p:sp>
+      <p:sp>
+        <p:nvSpPr>
+          <p:cNvPr id="15" name="Oval 14"/>
+          <p:cNvSpPr/>
+          <p:nvPr/>
+        </p:nvSpPr>
+        <p:spPr>
+          <a:xfrm>
+            <a:off x="6934200" y="5867400"/>
+            <a:ext cx="533400" cy="533400"/>
+          </a:xfrm>
+          <a:prstGeom prst="ellipse">
+            <a:avLst/>
+          </a:prstGeom>
+        </p:spPr>
+        <p:style>
+          <a:lnRef idx="2">
+            <a:schemeClr val="accent1">
+              <a:shade val="50000"/>
+            </a:schemeClr>
+          </a:lnRef>
+          <a:fillRef idx="1">
+            <a:schemeClr val="accent1"/>
+          </a:fillRef>
+          <a:effectRef idx="0">
+            <a:schemeClr val="accent1"/>
+          </a:effectRef>
+          <a:fontRef idx="minor">
+            <a:schemeClr val="lt1"/>
+          </a:fontRef>
+        </p:style>
+        <p:txBody>
+          <a:bodyPr rtlCol="0" anchor="ctr"/>
+          <a:lstStyle/>
+          <a:p>
+            <a:pPr algn="ctr"/>
+            <a:endParaRPr lang="en-US"/>
+          </a:p>
+        </p:txBody>
+      </p:sp>
+    </p:spTree>
+    <p:extLst>
+      <p:ext uri="{BB962C8B-B14F-4D97-AF65-F5344CB8AC3E}">
+        <p14:creationId xmlns:p14="http://schemas.microsoft.com/office/powerpoint/2010/main" val="3501674845"/>
+      </p:ext>
+    </p:extLst>
+  </p:cSld>
+  <p:clrMapOvr>
+    <a:masterClrMapping/>
+  </p:clrMapOvr>
+</p:sld>
+</file>
+
+<file path=ppt/slides/slide4.xml><?xml version="1.0" encoding="utf-8"?>
+<p:sld xmlns:a="http://schemas.openxmlformats.org/drawingml/2006/main" xmlns:r="http://schemas.openxmlformats.org/officeDocument/2006/relationships" xmlns:p="http://schemas.openxmlformats.org/presentationml/2006/main">
+  <p:cSld>
+    <p:spTree>
+      <p:nvGrpSpPr>
+        <p:cNvPr id="1" name=""/>
+        <p:cNvGrpSpPr/>
+        <p:nvPr/>
+      </p:nvGrpSpPr>
+      <p:grpSpPr>
+        <a:xfrm>
+          <a:off x="0" y="0"/>
+          <a:ext cx="0" cy="0"/>
+          <a:chOff x="0" y="0"/>
+          <a:chExt cx="0" cy="0"/>
+        </a:xfrm>
+      </p:grpSpPr>
+      <p:sp>
+        <p:nvSpPr>
+          <p:cNvPr id="2" name="Title 1"/>
+          <p:cNvSpPr>
+            <a:spLocks noGrp="1"/>
+          </p:cNvSpPr>
+          <p:nvPr>
+            <p:ph type="title"/>
+          </p:nvPr>
+        </p:nvSpPr>
         <p:spPr>
           <a:xfrm>
             <a:off x="381000" y="0"/>
@@ -3831,7 +4859,7 @@
 </p:sld>
 </file>
 
-<file path=ppt/slides/slide3.xml><?xml version="1.0" encoding="utf-8"?>
+<file path=ppt/slides/slide5.xml><?xml version="1.0" encoding="utf-8"?>
 <p:sld xmlns:a="http://schemas.openxmlformats.org/drawingml/2006/main" xmlns:r="http://schemas.openxmlformats.org/officeDocument/2006/relationships" xmlns:p="http://schemas.openxmlformats.org/presentationml/2006/main">
   <p:cSld>
     <p:spTree>
@@ -3871,8 +4899,8 @@
         </p:blipFill>
         <p:spPr bwMode="auto">
           <a:xfrm>
-            <a:off x="1133475" y="776288"/>
-            <a:ext cx="6877050" cy="5305425"/>
+            <a:off x="152400" y="2177"/>
+            <a:ext cx="4920115" cy="3795712"/>
           </a:xfrm>
           <a:prstGeom prst="rect">
             <a:avLst/>
@@ -3925,7 +4953,7 @@
 </p:sld>
 </file>
 
-<file path=ppt/slides/slide4.xml><?xml version="1.0" encoding="utf-8"?>
+<file path=ppt/slides/slide6.xml><?xml version="1.0" encoding="utf-8"?>
 <p:sld xmlns:a="http://schemas.openxmlformats.org/drawingml/2006/main" xmlns:r="http://schemas.openxmlformats.org/officeDocument/2006/relationships" xmlns:p="http://schemas.openxmlformats.org/presentationml/2006/main">
   <p:cSld>
     <p:spTree>
@@ -3942,9 +4970,35 @@
           <a:chExt cx="0" cy="0"/>
         </a:xfrm>
       </p:grpSpPr>
+      <p:sp>
+        <p:nvSpPr>
+          <p:cNvPr id="7" name="TextBox 6"/>
+          <p:cNvSpPr txBox="1"/>
+          <p:nvPr/>
+        </p:nvSpPr>
+        <p:spPr>
+          <a:xfrm>
+            <a:off x="609600" y="685800"/>
+            <a:ext cx="184731" cy="369332"/>
+          </a:xfrm>
+          <a:prstGeom prst="rect">
+            <a:avLst/>
+          </a:prstGeom>
+          <a:noFill/>
+        </p:spPr>
+        <p:txBody>
+          <a:bodyPr wrap="none" rtlCol="0">
+            <a:spAutoFit/>
+          </a:bodyPr>
+          <a:lstStyle/>
+          <a:p>
+            <a:endParaRPr lang="en-US"/>
+          </a:p>
+        </p:txBody>
+      </p:sp>
       <p:pic>
         <p:nvPicPr>
-          <p:cNvPr id="3074" name="Picture 2"/>
+          <p:cNvPr id="1026" name="Picture 2"/>
           <p:cNvPicPr>
             <a:picLocks noChangeAspect="1" noChangeArrowheads="1"/>
           </p:cNvPicPr>
@@ -3965,8 +5019,8 @@
         </p:blipFill>
         <p:spPr bwMode="auto">
           <a:xfrm>
-            <a:off x="369332" y="3183493"/>
-            <a:ext cx="4344612" cy="3305175"/>
+            <a:off x="1828800" y="1371600"/>
+            <a:ext cx="5486400" cy="4114800"/>
           </a:xfrm>
           <a:prstGeom prst="rect">
             <a:avLst/>
@@ -4008,14 +5062,14 @@
       </p:pic>
       <p:sp>
         <p:nvSpPr>
-          <p:cNvPr id="4" name="TextBox 3"/>
+          <p:cNvPr id="2" name="TextBox 1"/>
           <p:cNvSpPr txBox="1"/>
           <p:nvPr/>
         </p:nvSpPr>
         <p:spPr>
           <a:xfrm>
-            <a:off x="2449150" y="2814161"/>
-            <a:ext cx="407484" cy="369332"/>
+            <a:off x="3813651" y="5486400"/>
+            <a:ext cx="1516697" cy="369332"/>
           </a:xfrm>
           <a:prstGeom prst="rect">
             <a:avLst/>
@@ -4030,7 +5084,7 @@
           <a:p>
             <a:r>
               <a:rPr lang="en-US" dirty="0" smtClean="0"/>
-              <a:t>F1</a:t>
+              <a:t>Droplet radius</a:t>
             </a:r>
             <a:endParaRPr lang="en-US" dirty="0"/>
           </a:p>
@@ -4038,14 +5092,14 @@
       </p:sp>
       <p:sp>
         <p:nvSpPr>
-          <p:cNvPr id="5" name="TextBox 4"/>
+          <p:cNvPr id="12" name="TextBox 11"/>
           <p:cNvSpPr txBox="1"/>
           <p:nvPr/>
         </p:nvSpPr>
         <p:spPr>
           <a:xfrm rot="16200000">
-            <a:off x="-310213" y="4512881"/>
-            <a:ext cx="989758" cy="369332"/>
+            <a:off x="885786" y="3244334"/>
+            <a:ext cx="1516697" cy="369332"/>
           </a:xfrm>
           <a:prstGeom prst="rect">
             <a:avLst/>
@@ -4060,189 +5114,9 @@
           <a:p>
             <a:r>
               <a:rPr lang="en-US" dirty="0" smtClean="0"/>
-              <a:t>Pressure</a:t>
+              <a:t>Droplet radius</a:t>
             </a:r>
             <a:endParaRPr lang="en-US" dirty="0"/>
-          </a:p>
-        </p:txBody>
-      </p:sp>
-      <p:sp>
-        <p:nvSpPr>
-          <p:cNvPr id="6" name="TextBox 5"/>
-          <p:cNvSpPr txBox="1"/>
-          <p:nvPr/>
-        </p:nvSpPr>
-        <p:spPr>
-          <a:xfrm>
-            <a:off x="1894544" y="6488668"/>
-            <a:ext cx="1516697" cy="369332"/>
-          </a:xfrm>
-          <a:prstGeom prst="rect">
-            <a:avLst/>
-          </a:prstGeom>
-          <a:noFill/>
-        </p:spPr>
-        <p:txBody>
-          <a:bodyPr wrap="none" rtlCol="0">
-            <a:spAutoFit/>
-          </a:bodyPr>
-          <a:lstStyle/>
-          <a:p>
-            <a:r>
-              <a:rPr lang="en-US" dirty="0" smtClean="0"/>
-              <a:t>Droplet radius</a:t>
-            </a:r>
-            <a:endParaRPr lang="en-US" dirty="0"/>
-          </a:p>
-        </p:txBody>
-      </p:sp>
-      <p:pic>
-        <p:nvPicPr>
-          <p:cNvPr id="3075" name="Picture 3"/>
-          <p:cNvPicPr>
-            <a:picLocks noChangeAspect="1" noChangeArrowheads="1"/>
-          </p:cNvPicPr>
-          <p:nvPr/>
-        </p:nvPicPr>
-        <p:blipFill>
-          <a:blip r:embed="rId3">
-            <a:extLst>
-              <a:ext uri="{28A0092B-C50C-407E-A947-70E740481C1C}">
-                <a14:useLocalDpi xmlns:a14="http://schemas.microsoft.com/office/drawing/2010/main" val="0"/>
-              </a:ext>
-            </a:extLst>
-          </a:blip>
-          <a:srcRect/>
-          <a:stretch>
-            <a:fillRect/>
-          </a:stretch>
-        </p:blipFill>
-        <p:spPr bwMode="auto">
-          <a:xfrm>
-            <a:off x="4708026" y="3161985"/>
-            <a:ext cx="4430056" cy="3272335"/>
-          </a:xfrm>
-          <a:prstGeom prst="rect">
-            <a:avLst/>
-          </a:prstGeom>
-          <a:noFill/>
-          <a:ln>
-            <a:noFill/>
-          </a:ln>
-          <a:effectLst/>
-          <a:extLst>
-            <a:ext uri="{909E8E84-426E-40DD-AFC4-6F175D3DCCD1}">
-              <a14:hiddenFill xmlns:a14="http://schemas.microsoft.com/office/drawing/2010/main">
-                <a:solidFill>
-                  <a:schemeClr val="accent1"/>
-                </a:solidFill>
-              </a14:hiddenFill>
-            </a:ext>
-            <a:ext uri="{91240B29-F687-4F45-9708-019B960494DF}">
-              <a14:hiddenLine xmlns:a14="http://schemas.microsoft.com/office/drawing/2010/main" w="9525">
-                <a:solidFill>
-                  <a:schemeClr val="tx1"/>
-                </a:solidFill>
-                <a:miter lim="800000"/>
-                <a:headEnd/>
-                <a:tailEnd/>
-              </a14:hiddenLine>
-            </a:ext>
-            <a:ext uri="{AF507438-7753-43E0-B8FC-AC1667EBCBE1}">
-              <a14:hiddenEffects xmlns:a14="http://schemas.microsoft.com/office/drawing/2010/main">
-                <a:effectLst>
-                  <a:outerShdw dist="35921" dir="2700000" algn="ctr" rotWithShape="0">
-                    <a:schemeClr val="bg2"/>
-                  </a:outerShdw>
-                </a:effectLst>
-              </a14:hiddenEffects>
-            </a:ext>
-          </a:extLst>
-        </p:spPr>
-      </p:pic>
-      <p:sp>
-        <p:nvSpPr>
-          <p:cNvPr id="9" name="TextBox 8"/>
-          <p:cNvSpPr txBox="1"/>
-          <p:nvPr/>
-        </p:nvSpPr>
-        <p:spPr>
-          <a:xfrm>
-            <a:off x="6324600" y="6434320"/>
-            <a:ext cx="1516697" cy="369332"/>
-          </a:xfrm>
-          <a:prstGeom prst="rect">
-            <a:avLst/>
-          </a:prstGeom>
-          <a:noFill/>
-        </p:spPr>
-        <p:txBody>
-          <a:bodyPr wrap="none" rtlCol="0">
-            <a:spAutoFit/>
-          </a:bodyPr>
-          <a:lstStyle/>
-          <a:p>
-            <a:r>
-              <a:rPr lang="en-US" dirty="0" smtClean="0"/>
-              <a:t>Droplet radius</a:t>
-            </a:r>
-            <a:endParaRPr lang="en-US" dirty="0"/>
-          </a:p>
-        </p:txBody>
-      </p:sp>
-      <p:sp>
-        <p:nvSpPr>
-          <p:cNvPr id="10" name="TextBox 9"/>
-          <p:cNvSpPr txBox="1"/>
-          <p:nvPr/>
-        </p:nvSpPr>
-        <p:spPr>
-          <a:xfrm>
-            <a:off x="6983916" y="2819400"/>
-            <a:ext cx="407484" cy="369332"/>
-          </a:xfrm>
-          <a:prstGeom prst="rect">
-            <a:avLst/>
-          </a:prstGeom>
-          <a:noFill/>
-        </p:spPr>
-        <p:txBody>
-          <a:bodyPr wrap="none" rtlCol="0">
-            <a:spAutoFit/>
-          </a:bodyPr>
-          <a:lstStyle/>
-          <a:p>
-            <a:r>
-              <a:rPr lang="en-US" dirty="0" smtClean="0"/>
-              <a:t>F5</a:t>
-            </a:r>
-            <a:endParaRPr lang="en-US" dirty="0"/>
-          </a:p>
-        </p:txBody>
-      </p:sp>
-      <p:sp>
-        <p:nvSpPr>
-          <p:cNvPr id="7" name="TextBox 6"/>
-          <p:cNvSpPr txBox="1"/>
-          <p:nvPr/>
-        </p:nvSpPr>
-        <p:spPr>
-          <a:xfrm>
-            <a:off x="609600" y="685800"/>
-            <a:ext cx="184731" cy="369332"/>
-          </a:xfrm>
-          <a:prstGeom prst="rect">
-            <a:avLst/>
-          </a:prstGeom>
-          <a:noFill/>
-        </p:spPr>
-        <p:txBody>
-          <a:bodyPr wrap="none" rtlCol="0">
-            <a:spAutoFit/>
-          </a:bodyPr>
-          <a:lstStyle/>
-          <a:p>
-            <a:endParaRPr lang="en-US"/>
           </a:p>
         </p:txBody>
       </p:sp>
@@ -4259,9 +5133,358 @@
 </p:sld>
 </file>
 
+<file path=ppt/slides/slide7.xml><?xml version="1.0" encoding="utf-8"?>
+<p:sld xmlns:a="http://schemas.openxmlformats.org/drawingml/2006/main" xmlns:r="http://schemas.openxmlformats.org/officeDocument/2006/relationships" xmlns:p="http://schemas.openxmlformats.org/presentationml/2006/main">
+  <p:cSld>
+    <p:spTree>
+      <p:nvGrpSpPr>
+        <p:cNvPr id="1" name=""/>
+        <p:cNvGrpSpPr/>
+        <p:nvPr/>
+      </p:nvGrpSpPr>
+      <p:grpSpPr>
+        <a:xfrm>
+          <a:off x="0" y="0"/>
+          <a:ext cx="0" cy="0"/>
+          <a:chOff x="0" y="0"/>
+          <a:chExt cx="0" cy="0"/>
+        </a:xfrm>
+      </p:grpSpPr>
+      <p:sp>
+        <p:nvSpPr>
+          <p:cNvPr id="2" name="Title 1"/>
+          <p:cNvSpPr>
+            <a:spLocks noGrp="1"/>
+          </p:cNvSpPr>
+          <p:nvPr>
+            <p:ph type="title"/>
+          </p:nvPr>
+        </p:nvSpPr>
+        <p:spPr/>
+        <p:txBody>
+          <a:bodyPr/>
+          <a:lstStyle/>
+          <a:p>
+            <a:r>
+              <a:rPr lang="en-US" dirty="0" smtClean="0"/>
+              <a:t>Experiments</a:t>
+            </a:r>
+            <a:endParaRPr lang="en-US" dirty="0"/>
+          </a:p>
+        </p:txBody>
+      </p:sp>
+      <p:cxnSp>
+        <p:nvCxnSpPr>
+          <p:cNvPr id="5" name="Straight Arrow Connector 4"/>
+          <p:cNvCxnSpPr/>
+          <p:nvPr/>
+        </p:nvCxnSpPr>
+        <p:spPr>
+          <a:xfrm>
+            <a:off x="1447800" y="5181600"/>
+            <a:ext cx="5943600" cy="0"/>
+          </a:xfrm>
+          <a:prstGeom prst="straightConnector1">
+            <a:avLst/>
+          </a:prstGeom>
+          <a:ln>
+            <a:tailEnd type="arrow"/>
+          </a:ln>
+        </p:spPr>
+        <p:style>
+          <a:lnRef idx="1">
+            <a:schemeClr val="accent1"/>
+          </a:lnRef>
+          <a:fillRef idx="0">
+            <a:schemeClr val="accent1"/>
+          </a:fillRef>
+          <a:effectRef idx="0">
+            <a:schemeClr val="accent1"/>
+          </a:effectRef>
+          <a:fontRef idx="minor">
+            <a:schemeClr val="tx1"/>
+          </a:fontRef>
+        </p:style>
+      </p:cxnSp>
+      <p:cxnSp>
+        <p:nvCxnSpPr>
+          <p:cNvPr id="7" name="Straight Arrow Connector 6"/>
+          <p:cNvCxnSpPr/>
+          <p:nvPr/>
+        </p:nvCxnSpPr>
+        <p:spPr>
+          <a:xfrm flipV="1">
+            <a:off x="1447800" y="1981200"/>
+            <a:ext cx="0" cy="3200400"/>
+          </a:xfrm>
+          <a:prstGeom prst="straightConnector1">
+            <a:avLst/>
+          </a:prstGeom>
+          <a:ln>
+            <a:tailEnd type="arrow"/>
+          </a:ln>
+        </p:spPr>
+        <p:style>
+          <a:lnRef idx="1">
+            <a:schemeClr val="accent1"/>
+          </a:lnRef>
+          <a:fillRef idx="0">
+            <a:schemeClr val="accent1"/>
+          </a:fillRef>
+          <a:effectRef idx="0">
+            <a:schemeClr val="accent1"/>
+          </a:effectRef>
+          <a:fontRef idx="minor">
+            <a:schemeClr val="tx1"/>
+          </a:fontRef>
+        </p:style>
+      </p:cxnSp>
+      <p:sp>
+        <p:nvSpPr>
+          <p:cNvPr id="8" name="TextBox 7"/>
+          <p:cNvSpPr txBox="1"/>
+          <p:nvPr/>
+        </p:nvSpPr>
+        <p:spPr>
+          <a:xfrm rot="16200000">
+            <a:off x="547280" y="3460449"/>
+            <a:ext cx="699102" cy="369332"/>
+          </a:xfrm>
+          <a:prstGeom prst="rect">
+            <a:avLst/>
+          </a:prstGeom>
+          <a:noFill/>
+        </p:spPr>
+        <p:txBody>
+          <a:bodyPr wrap="none" rtlCol="0">
+            <a:spAutoFit/>
+          </a:bodyPr>
+          <a:lstStyle/>
+          <a:p>
+            <a:r>
+              <a:rPr lang="en-US" dirty="0" smtClean="0"/>
+              <a:t>Force</a:t>
+            </a:r>
+            <a:endParaRPr lang="en-US" dirty="0"/>
+          </a:p>
+        </p:txBody>
+      </p:sp>
+      <p:sp>
+        <p:nvSpPr>
+          <p:cNvPr id="9" name="TextBox 8"/>
+          <p:cNvSpPr txBox="1"/>
+          <p:nvPr/>
+        </p:nvSpPr>
+        <p:spPr>
+          <a:xfrm>
+            <a:off x="3926003" y="5440289"/>
+            <a:ext cx="987193" cy="369332"/>
+          </a:xfrm>
+          <a:prstGeom prst="rect">
+            <a:avLst/>
+          </a:prstGeom>
+          <a:noFill/>
+        </p:spPr>
+        <p:txBody>
+          <a:bodyPr wrap="none" rtlCol="0">
+            <a:spAutoFit/>
+          </a:bodyPr>
+          <a:lstStyle/>
+          <a:p>
+            <a:r>
+              <a:rPr lang="en-US" dirty="0" smtClean="0"/>
+              <a:t>Distance</a:t>
+            </a:r>
+            <a:endParaRPr lang="en-US" dirty="0"/>
+          </a:p>
+        </p:txBody>
+      </p:sp>
+      <p:cxnSp>
+        <p:nvCxnSpPr>
+          <p:cNvPr id="11" name="Straight Connector 10"/>
+          <p:cNvCxnSpPr/>
+          <p:nvPr/>
+        </p:nvCxnSpPr>
+        <p:spPr>
+          <a:xfrm>
+            <a:off x="1828800" y="4191000"/>
+            <a:ext cx="1981200" cy="0"/>
+          </a:xfrm>
+          <a:prstGeom prst="line">
+            <a:avLst/>
+          </a:prstGeom>
+        </p:spPr>
+        <p:style>
+          <a:lnRef idx="1">
+            <a:schemeClr val="accent1"/>
+          </a:lnRef>
+          <a:fillRef idx="0">
+            <a:schemeClr val="accent1"/>
+          </a:fillRef>
+          <a:effectRef idx="0">
+            <a:schemeClr val="accent1"/>
+          </a:effectRef>
+          <a:fontRef idx="minor">
+            <a:schemeClr val="tx1"/>
+          </a:fontRef>
+        </p:style>
+      </p:cxnSp>
+      <p:cxnSp>
+        <p:nvCxnSpPr>
+          <p:cNvPr id="13" name="Straight Connector 12"/>
+          <p:cNvCxnSpPr/>
+          <p:nvPr/>
+        </p:nvCxnSpPr>
+        <p:spPr>
+          <a:xfrm flipV="1">
+            <a:off x="3810000" y="3295564"/>
+            <a:ext cx="1103196" cy="895436"/>
+          </a:xfrm>
+          <a:prstGeom prst="line">
+            <a:avLst/>
+          </a:prstGeom>
+        </p:spPr>
+        <p:style>
+          <a:lnRef idx="1">
+            <a:schemeClr val="accent1"/>
+          </a:lnRef>
+          <a:fillRef idx="0">
+            <a:schemeClr val="accent1"/>
+          </a:fillRef>
+          <a:effectRef idx="0">
+            <a:schemeClr val="accent1"/>
+          </a:effectRef>
+          <a:fontRef idx="minor">
+            <a:schemeClr val="tx1"/>
+          </a:fontRef>
+        </p:style>
+      </p:cxnSp>
+      <p:sp>
+        <p:nvSpPr>
+          <p:cNvPr id="14" name="Freeform 13"/>
+          <p:cNvSpPr/>
+          <p:nvPr/>
+        </p:nvSpPr>
+        <p:spPr>
+          <a:xfrm>
+            <a:off x="4898572" y="3278777"/>
+            <a:ext cx="953588" cy="1489166"/>
+          </a:xfrm>
+          <a:custGeom>
+            <a:avLst/>
+            <a:gdLst>
+              <a:gd name="connsiteX0" fmla="*/ 13062 w 953588"/>
+              <a:gd name="connsiteY0" fmla="*/ 0 h 1489166"/>
+              <a:gd name="connsiteX1" fmla="*/ 130628 w 953588"/>
+              <a:gd name="connsiteY1" fmla="*/ 378823 h 1489166"/>
+              <a:gd name="connsiteX2" fmla="*/ 953588 w 953588"/>
+              <a:gd name="connsiteY2" fmla="*/ 1489166 h 1489166"/>
+            </a:gdLst>
+            <a:ahLst/>
+            <a:cxnLst>
+              <a:cxn ang="0">
+                <a:pos x="connsiteX0" y="connsiteY0"/>
+              </a:cxn>
+              <a:cxn ang="0">
+                <a:pos x="connsiteX1" y="connsiteY1"/>
+              </a:cxn>
+              <a:cxn ang="0">
+                <a:pos x="connsiteX2" y="connsiteY2"/>
+              </a:cxn>
+            </a:cxnLst>
+            <a:rect l="l" t="t" r="r" b="b"/>
+            <a:pathLst>
+              <a:path w="953588" h="1489166">
+                <a:moveTo>
+                  <a:pt x="13062" y="0"/>
+                </a:moveTo>
+                <a:cubicBezTo>
+                  <a:pt x="-6532" y="65314"/>
+                  <a:pt x="-26126" y="130629"/>
+                  <a:pt x="130628" y="378823"/>
+                </a:cubicBezTo>
+                <a:cubicBezTo>
+                  <a:pt x="287382" y="627017"/>
+                  <a:pt x="620485" y="1058091"/>
+                  <a:pt x="953588" y="1489166"/>
+                </a:cubicBezTo>
+              </a:path>
+            </a:pathLst>
+          </a:custGeom>
+          <a:noFill/>
+        </p:spPr>
+        <p:style>
+          <a:lnRef idx="2">
+            <a:schemeClr val="accent1">
+              <a:shade val="50000"/>
+            </a:schemeClr>
+          </a:lnRef>
+          <a:fillRef idx="1">
+            <a:schemeClr val="accent1"/>
+          </a:fillRef>
+          <a:effectRef idx="0">
+            <a:schemeClr val="accent1"/>
+          </a:effectRef>
+          <a:fontRef idx="minor">
+            <a:schemeClr val="lt1"/>
+          </a:fontRef>
+        </p:style>
+        <p:txBody>
+          <a:bodyPr rtlCol="0" anchor="ctr"/>
+          <a:lstStyle/>
+          <a:p>
+            <a:pPr algn="ctr"/>
+            <a:endParaRPr lang="en-US"/>
+          </a:p>
+        </p:txBody>
+      </p:sp>
+      <p:cxnSp>
+        <p:nvCxnSpPr>
+          <p:cNvPr id="16" name="Straight Connector 15"/>
+          <p:cNvCxnSpPr/>
+          <p:nvPr/>
+        </p:nvCxnSpPr>
+        <p:spPr>
+          <a:xfrm>
+            <a:off x="1828800" y="3505200"/>
+            <a:ext cx="1905000" cy="0"/>
+          </a:xfrm>
+          <a:prstGeom prst="line">
+            <a:avLst/>
+          </a:prstGeom>
+        </p:spPr>
+        <p:style>
+          <a:lnRef idx="1">
+            <a:schemeClr val="accent1"/>
+          </a:lnRef>
+          <a:fillRef idx="0">
+            <a:schemeClr val="accent1"/>
+          </a:fillRef>
+          <a:effectRef idx="0">
+            <a:schemeClr val="accent1"/>
+          </a:effectRef>
+          <a:fontRef idx="minor">
+            <a:schemeClr val="tx1"/>
+          </a:fontRef>
+        </p:style>
+      </p:cxnSp>
+    </p:spTree>
+    <p:extLst>
+      <p:ext uri="{BB962C8B-B14F-4D97-AF65-F5344CB8AC3E}">
+        <p14:creationId xmlns:p14="http://schemas.microsoft.com/office/powerpoint/2010/main" val="2759423179"/>
+      </p:ext>
+    </p:extLst>
+  </p:cSld>
+  <p:clrMapOvr>
+    <a:masterClrMapping/>
+  </p:clrMapOvr>
+</p:sld>
+</file>
+
 <file path=ppt/tags/tag1.xml><?xml version="1.0" encoding="utf-8"?>
 <p:tagLst xmlns:a="http://schemas.openxmlformats.org/drawingml/2006/main" xmlns:r="http://schemas.openxmlformats.org/officeDocument/2006/relationships" xmlns:p="http://schemas.openxmlformats.org/presentationml/2006/main">
-  <p:tag name="ISPRING_RESOURCE_PATHS_HASH_2" val="a4e558dd8f38bb32cbbfa63d8b64ab151fe5d3"/>
+  <p:tag name="ISPRING_RESOURCE_PATHS_HASH_2" val="2186371f674c13e3b955df5b08386462663753"/>
+  <p:tag name="ISPRING_RESOURCE_PATHS_HASH" val="d87786715bb7f1c7a358c1a684be96fd391332"/>
 </p:tagLst>
 </file>
 

</xml_diff>